<commit_message>
Update the skills presentation
</commit_message>
<xml_diff>
--- a/SkillsVision/Stats.pptx
+++ b/SkillsVision/Stats.pptx
@@ -200,7 +200,6 @@
           </a:p>
         </c:rich>
       </c:tx>
-      <c:layout/>
       <c:overlay val="0"/>
       <c:spPr>
         <a:noFill/>
@@ -360,9 +359,7 @@
               </c:spPr>
             </c:leaderLines>
             <c:extLst>
-              <c:ext xmlns:c15="http://schemas.microsoft.com/office/drawing/2012/chart" uri="{CE6537A1-D6FC-4f65-9D91-7224C49458BB}">
-                <c15:layout/>
-              </c:ext>
+              <c:ext xmlns:c15="http://schemas.microsoft.com/office/drawing/2012/chart" uri="{CE6537A1-D6FC-4f65-9D91-7224C49458BB}"/>
             </c:extLst>
           </c:dLbls>
           <c:cat>
@@ -423,7 +420,6 @@
     </c:plotArea>
     <c:legend>
       <c:legendPos val="b"/>
-      <c:layout/>
       <c:overlay val="0"/>
       <c:spPr>
         <a:solidFill>
@@ -540,7 +536,6 @@
           </a:p>
         </c:rich>
       </c:tx>
-      <c:layout/>
       <c:overlay val="0"/>
       <c:spPr>
         <a:noFill/>
@@ -571,6 +566,883 @@
       </c:txPr>
     </c:title>
     <c:autoTitleDeleted val="0"/>
+    <c:plotArea>
+      <c:layout/>
+      <c:pieChart>
+        <c:varyColors val="1"/>
+        <c:ser>
+          <c:idx val="0"/>
+          <c:order val="0"/>
+          <c:tx>
+            <c:strRef>
+              <c:f>Sheet1!$B$1</c:f>
+              <c:strCache>
+                <c:ptCount val="1"/>
+                <c:pt idx="0">
+                  <c:v>Sales</c:v>
+                </c:pt>
+              </c:strCache>
+            </c:strRef>
+          </c:tx>
+          <c:dPt>
+            <c:idx val="0"/>
+            <c:bubble3D val="0"/>
+            <c:spPr>
+              <a:solidFill>
+                <a:schemeClr val="accent1">
+                  <a:shade val="53000"/>
+                </a:schemeClr>
+              </a:solidFill>
+              <a:ln>
+                <a:noFill/>
+              </a:ln>
+              <a:effectLst>
+                <a:outerShdw blurRad="317500" algn="ctr" rotWithShape="0">
+                  <a:prstClr val="black">
+                    <a:alpha val="25000"/>
+                  </a:prstClr>
+                </a:outerShdw>
+              </a:effectLst>
+            </c:spPr>
+          </c:dPt>
+          <c:dPt>
+            <c:idx val="1"/>
+            <c:bubble3D val="0"/>
+            <c:spPr>
+              <a:solidFill>
+                <a:schemeClr val="accent1">
+                  <a:shade val="76000"/>
+                </a:schemeClr>
+              </a:solidFill>
+              <a:ln>
+                <a:noFill/>
+              </a:ln>
+              <a:effectLst>
+                <a:outerShdw blurRad="317500" algn="ctr" rotWithShape="0">
+                  <a:prstClr val="black">
+                    <a:alpha val="25000"/>
+                  </a:prstClr>
+                </a:outerShdw>
+              </a:effectLst>
+            </c:spPr>
+          </c:dPt>
+          <c:dLbls>
+            <c:spPr>
+              <a:noFill/>
+              <a:ln>
+                <a:noFill/>
+              </a:ln>
+              <a:effectLst/>
+            </c:spPr>
+            <c:txPr>
+              <a:bodyPr rot="0" spcFirstLastPara="1" vertOverflow="ellipsis" vert="horz" wrap="square" lIns="38100" tIns="19050" rIns="38100" bIns="19050" anchor="ctr" anchorCtr="1">
+                <a:spAutoFit/>
+              </a:bodyPr>
+              <a:lstStyle/>
+              <a:p>
+                <a:pPr>
+                  <a:defRPr sz="1197" b="1" i="0" u="none" strike="noStrike" kern="1200" baseline="0">
+                    <a:solidFill>
+                      <a:schemeClr val="lt1"/>
+                    </a:solidFill>
+                    <a:latin typeface="+mn-lt"/>
+                    <a:ea typeface="+mn-ea"/>
+                    <a:cs typeface="+mn-cs"/>
+                  </a:defRPr>
+                </a:pPr>
+                <a:endParaRPr lang="en-US"/>
+              </a:p>
+            </c:txPr>
+            <c:dLblPos val="inEnd"/>
+            <c:showLegendKey val="0"/>
+            <c:showVal val="0"/>
+            <c:showCatName val="0"/>
+            <c:showSerName val="0"/>
+            <c:showPercent val="1"/>
+            <c:showBubbleSize val="0"/>
+            <c:showLeaderLines val="1"/>
+            <c:leaderLines>
+              <c:spPr>
+                <a:ln w="9525" cap="flat" cmpd="sng" algn="ctr">
+                  <a:solidFill>
+                    <a:schemeClr val="dk1">
+                      <a:lumMod val="35000"/>
+                      <a:lumOff val="65000"/>
+                    </a:schemeClr>
+                  </a:solidFill>
+                  <a:round/>
+                </a:ln>
+                <a:effectLst/>
+              </c:spPr>
+            </c:leaderLines>
+            <c:extLst>
+              <c:ext xmlns:c15="http://schemas.microsoft.com/office/drawing/2012/chart" uri="{CE6537A1-D6FC-4f65-9D91-7224C49458BB}"/>
+            </c:extLst>
+          </c:dLbls>
+          <c:cat>
+            <c:strRef>
+              <c:f>Sheet1!$A$2:$A$3</c:f>
+              <c:strCache>
+                <c:ptCount val="2"/>
+                <c:pt idx="0">
+                  <c:v>Know it (3)</c:v>
+                </c:pt>
+                <c:pt idx="1">
+                  <c:v>Don't know it (42)</c:v>
+                </c:pt>
+              </c:strCache>
+            </c:strRef>
+          </c:cat>
+          <c:val>
+            <c:numRef>
+              <c:f>Sheet1!$B$2:$B$3</c:f>
+              <c:numCache>
+                <c:formatCode>General</c:formatCode>
+                <c:ptCount val="2"/>
+                <c:pt idx="0">
+                  <c:v>3</c:v>
+                </c:pt>
+                <c:pt idx="1">
+                  <c:v>42</c:v>
+                </c:pt>
+              </c:numCache>
+            </c:numRef>
+          </c:val>
+        </c:ser>
+        <c:dLbls>
+          <c:dLblPos val="inEnd"/>
+          <c:showLegendKey val="0"/>
+          <c:showVal val="0"/>
+          <c:showCatName val="0"/>
+          <c:showSerName val="0"/>
+          <c:showPercent val="1"/>
+          <c:showBubbleSize val="0"/>
+          <c:showLeaderLines val="1"/>
+        </c:dLbls>
+        <c:firstSliceAng val="0"/>
+      </c:pieChart>
+      <c:spPr>
+        <a:noFill/>
+        <a:ln>
+          <a:noFill/>
+        </a:ln>
+        <a:effectLst/>
+      </c:spPr>
+    </c:plotArea>
+    <c:legend>
+      <c:legendPos val="b"/>
+      <c:overlay val="0"/>
+      <c:spPr>
+        <a:solidFill>
+          <a:schemeClr val="lt1">
+            <a:alpha val="78000"/>
+          </a:schemeClr>
+        </a:solidFill>
+        <a:ln>
+          <a:noFill/>
+        </a:ln>
+        <a:effectLst/>
+      </c:spPr>
+      <c:txPr>
+        <a:bodyPr rot="0" spcFirstLastPara="1" vertOverflow="ellipsis" vert="horz" wrap="square" anchor="ctr" anchorCtr="1"/>
+        <a:lstStyle/>
+        <a:p>
+          <a:pPr>
+            <a:defRPr sz="1197" b="0" i="0" u="none" strike="noStrike" kern="1200" baseline="0">
+              <a:solidFill>
+                <a:schemeClr val="dk1">
+                  <a:lumMod val="65000"/>
+                  <a:lumOff val="35000"/>
+                </a:schemeClr>
+              </a:solidFill>
+              <a:latin typeface="+mn-lt"/>
+              <a:ea typeface="+mn-ea"/>
+              <a:cs typeface="+mn-cs"/>
+            </a:defRPr>
+          </a:pPr>
+          <a:endParaRPr lang="en-US"/>
+        </a:p>
+      </c:txPr>
+    </c:legend>
+    <c:plotVisOnly val="1"/>
+    <c:dispBlanksAs val="gap"/>
+    <c:showDLblsOverMax val="0"/>
+  </c:chart>
+  <c:spPr>
+    <a:pattFill prst="dkDnDiag">
+      <a:fgClr>
+        <a:schemeClr val="lt1">
+          <a:lumMod val="95000"/>
+        </a:schemeClr>
+      </a:fgClr>
+      <a:bgClr>
+        <a:schemeClr val="lt1"/>
+      </a:bgClr>
+    </a:pattFill>
+    <a:ln w="9525" cap="flat" cmpd="sng" algn="ctr">
+      <a:solidFill>
+        <a:schemeClr val="dk1">
+          <a:lumMod val="15000"/>
+          <a:lumOff val="85000"/>
+        </a:schemeClr>
+      </a:solidFill>
+      <a:round/>
+    </a:ln>
+    <a:effectLst/>
+  </c:spPr>
+  <c:txPr>
+    <a:bodyPr/>
+    <a:lstStyle/>
+    <a:p>
+      <a:pPr>
+        <a:defRPr/>
+      </a:pPr>
+      <a:endParaRPr lang="en-US"/>
+    </a:p>
+  </c:txPr>
+  <c:externalData r:id="rId3">
+    <c:autoUpdate val="0"/>
+  </c:externalData>
+</c:chartSpace>
+</file>
+
+<file path=ppt/charts/chart11.xml><?xml version="1.0" encoding="utf-8"?>
+<c:chartSpace xmlns:c="http://schemas.openxmlformats.org/drawingml/2006/chart" xmlns:a="http://schemas.openxmlformats.org/drawingml/2006/main" xmlns:r="http://schemas.openxmlformats.org/officeDocument/2006/relationships">
+  <c:date1904 val="0"/>
+  <c:lang val="en-US"/>
+  <c:roundedCorners val="0"/>
+  <mc:AlternateContent xmlns:mc="http://schemas.openxmlformats.org/markup-compatibility/2006">
+    <mc:Choice xmlns:c14="http://schemas.microsoft.com/office/drawing/2007/8/2/chart" Requires="c14">
+      <c14:style val="103"/>
+    </mc:Choice>
+    <mc:Fallback>
+      <c:style val="3"/>
+    </mc:Fallback>
+  </mc:AlternateContent>
+  <c:chart>
+    <c:title>
+      <c:tx>
+        <c:rich>
+          <a:bodyPr rot="0" spcFirstLastPara="1" vertOverflow="ellipsis" vert="horz" wrap="square" anchor="ctr" anchorCtr="1"/>
+          <a:lstStyle/>
+          <a:p>
+            <a:pPr>
+              <a:defRPr sz="2200" b="1" i="0" u="none" strike="noStrike" kern="1200" baseline="0">
+                <a:solidFill>
+                  <a:schemeClr val="dk1">
+                    <a:lumMod val="65000"/>
+                    <a:lumOff val="35000"/>
+                  </a:schemeClr>
+                </a:solidFill>
+                <a:latin typeface="+mn-lt"/>
+                <a:ea typeface="+mn-ea"/>
+                <a:cs typeface="+mn-cs"/>
+              </a:defRPr>
+            </a:pPr>
+            <a:r>
+              <a:rPr lang="en-US" dirty="0" err="1" smtClean="0"/>
+              <a:t>SkillF</a:t>
+            </a:r>
+            <a:endParaRPr lang="en-US" dirty="0"/>
+          </a:p>
+        </c:rich>
+      </c:tx>
+      <c:overlay val="0"/>
+      <c:spPr>
+        <a:noFill/>
+        <a:ln>
+          <a:noFill/>
+        </a:ln>
+        <a:effectLst/>
+      </c:spPr>
+      <c:txPr>
+        <a:bodyPr rot="0" spcFirstLastPara="1" vertOverflow="ellipsis" vert="horz" wrap="square" anchor="ctr" anchorCtr="1"/>
+        <a:lstStyle/>
+        <a:p>
+          <a:pPr>
+            <a:defRPr sz="2200" b="1" i="0" u="none" strike="noStrike" kern="1200" baseline="0">
+              <a:solidFill>
+                <a:schemeClr val="dk1">
+                  <a:lumMod val="65000"/>
+                  <a:lumOff val="35000"/>
+                </a:schemeClr>
+              </a:solidFill>
+              <a:latin typeface="+mn-lt"/>
+              <a:ea typeface="+mn-ea"/>
+              <a:cs typeface="+mn-cs"/>
+            </a:defRPr>
+          </a:pPr>
+          <a:endParaRPr lang="en-US"/>
+        </a:p>
+      </c:txPr>
+    </c:title>
+    <c:autoTitleDeleted val="0"/>
+    <c:plotArea>
+      <c:layout/>
+      <c:pieChart>
+        <c:varyColors val="1"/>
+        <c:ser>
+          <c:idx val="0"/>
+          <c:order val="0"/>
+          <c:tx>
+            <c:strRef>
+              <c:f>Sheet1!$B$1</c:f>
+              <c:strCache>
+                <c:ptCount val="1"/>
+                <c:pt idx="0">
+                  <c:v>Sales</c:v>
+                </c:pt>
+              </c:strCache>
+            </c:strRef>
+          </c:tx>
+          <c:dPt>
+            <c:idx val="0"/>
+            <c:bubble3D val="0"/>
+            <c:spPr>
+              <a:solidFill>
+                <a:schemeClr val="accent1">
+                  <a:shade val="53000"/>
+                </a:schemeClr>
+              </a:solidFill>
+              <a:ln>
+                <a:noFill/>
+              </a:ln>
+              <a:effectLst>
+                <a:outerShdw blurRad="317500" algn="ctr" rotWithShape="0">
+                  <a:prstClr val="black">
+                    <a:alpha val="25000"/>
+                  </a:prstClr>
+                </a:outerShdw>
+              </a:effectLst>
+            </c:spPr>
+          </c:dPt>
+          <c:dPt>
+            <c:idx val="1"/>
+            <c:bubble3D val="0"/>
+            <c:spPr>
+              <a:solidFill>
+                <a:schemeClr val="accent1">
+                  <a:shade val="76000"/>
+                </a:schemeClr>
+              </a:solidFill>
+              <a:ln>
+                <a:noFill/>
+              </a:ln>
+              <a:effectLst>
+                <a:outerShdw blurRad="317500" algn="ctr" rotWithShape="0">
+                  <a:prstClr val="black">
+                    <a:alpha val="25000"/>
+                  </a:prstClr>
+                </a:outerShdw>
+              </a:effectLst>
+            </c:spPr>
+          </c:dPt>
+          <c:dLbls>
+            <c:spPr>
+              <a:noFill/>
+              <a:ln>
+                <a:noFill/>
+              </a:ln>
+              <a:effectLst/>
+            </c:spPr>
+            <c:txPr>
+              <a:bodyPr rot="0" spcFirstLastPara="1" vertOverflow="ellipsis" vert="horz" wrap="square" lIns="38100" tIns="19050" rIns="38100" bIns="19050" anchor="ctr" anchorCtr="1">
+                <a:spAutoFit/>
+              </a:bodyPr>
+              <a:lstStyle/>
+              <a:p>
+                <a:pPr>
+                  <a:defRPr sz="1197" b="1" i="0" u="none" strike="noStrike" kern="1200" baseline="0">
+                    <a:solidFill>
+                      <a:schemeClr val="lt1"/>
+                    </a:solidFill>
+                    <a:latin typeface="+mn-lt"/>
+                    <a:ea typeface="+mn-ea"/>
+                    <a:cs typeface="+mn-cs"/>
+                  </a:defRPr>
+                </a:pPr>
+                <a:endParaRPr lang="en-US"/>
+              </a:p>
+            </c:txPr>
+            <c:dLblPos val="inEnd"/>
+            <c:showLegendKey val="0"/>
+            <c:showVal val="0"/>
+            <c:showCatName val="0"/>
+            <c:showSerName val="0"/>
+            <c:showPercent val="1"/>
+            <c:showBubbleSize val="0"/>
+            <c:showLeaderLines val="1"/>
+            <c:leaderLines>
+              <c:spPr>
+                <a:ln w="9525" cap="flat" cmpd="sng" algn="ctr">
+                  <a:solidFill>
+                    <a:schemeClr val="dk1">
+                      <a:lumMod val="35000"/>
+                      <a:lumOff val="65000"/>
+                    </a:schemeClr>
+                  </a:solidFill>
+                  <a:round/>
+                </a:ln>
+                <a:effectLst/>
+              </c:spPr>
+            </c:leaderLines>
+            <c:extLst>
+              <c:ext xmlns:c15="http://schemas.microsoft.com/office/drawing/2012/chart" uri="{CE6537A1-D6FC-4f65-9D91-7224C49458BB}"/>
+            </c:extLst>
+          </c:dLbls>
+          <c:cat>
+            <c:strRef>
+              <c:f>Sheet1!$A$2:$A$3</c:f>
+              <c:strCache>
+                <c:ptCount val="2"/>
+                <c:pt idx="0">
+                  <c:v>Know it (30)</c:v>
+                </c:pt>
+                <c:pt idx="1">
+                  <c:v>Don't know it(15)</c:v>
+                </c:pt>
+              </c:strCache>
+            </c:strRef>
+          </c:cat>
+          <c:val>
+            <c:numRef>
+              <c:f>Sheet1!$B$2:$B$3</c:f>
+              <c:numCache>
+                <c:formatCode>General</c:formatCode>
+                <c:ptCount val="2"/>
+                <c:pt idx="0">
+                  <c:v>30</c:v>
+                </c:pt>
+                <c:pt idx="1">
+                  <c:v>15</c:v>
+                </c:pt>
+              </c:numCache>
+            </c:numRef>
+          </c:val>
+        </c:ser>
+        <c:dLbls>
+          <c:dLblPos val="inEnd"/>
+          <c:showLegendKey val="0"/>
+          <c:showVal val="0"/>
+          <c:showCatName val="0"/>
+          <c:showSerName val="0"/>
+          <c:showPercent val="1"/>
+          <c:showBubbleSize val="0"/>
+          <c:showLeaderLines val="1"/>
+        </c:dLbls>
+        <c:firstSliceAng val="0"/>
+      </c:pieChart>
+      <c:spPr>
+        <a:noFill/>
+        <a:ln>
+          <a:noFill/>
+        </a:ln>
+        <a:effectLst/>
+      </c:spPr>
+    </c:plotArea>
+    <c:legend>
+      <c:legendPos val="b"/>
+      <c:overlay val="0"/>
+      <c:spPr>
+        <a:solidFill>
+          <a:schemeClr val="lt1">
+            <a:alpha val="78000"/>
+          </a:schemeClr>
+        </a:solidFill>
+        <a:ln>
+          <a:noFill/>
+        </a:ln>
+        <a:effectLst/>
+      </c:spPr>
+      <c:txPr>
+        <a:bodyPr rot="0" spcFirstLastPara="1" vertOverflow="ellipsis" vert="horz" wrap="square" anchor="ctr" anchorCtr="1"/>
+        <a:lstStyle/>
+        <a:p>
+          <a:pPr>
+            <a:defRPr sz="1197" b="0" i="0" u="none" strike="noStrike" kern="1200" baseline="0">
+              <a:solidFill>
+                <a:schemeClr val="dk1">
+                  <a:lumMod val="65000"/>
+                  <a:lumOff val="35000"/>
+                </a:schemeClr>
+              </a:solidFill>
+              <a:latin typeface="+mn-lt"/>
+              <a:ea typeface="+mn-ea"/>
+              <a:cs typeface="+mn-cs"/>
+            </a:defRPr>
+          </a:pPr>
+          <a:endParaRPr lang="en-US"/>
+        </a:p>
+      </c:txPr>
+    </c:legend>
+    <c:plotVisOnly val="1"/>
+    <c:dispBlanksAs val="gap"/>
+    <c:showDLblsOverMax val="0"/>
+  </c:chart>
+  <c:spPr>
+    <a:pattFill prst="dkDnDiag">
+      <a:fgClr>
+        <a:schemeClr val="lt1">
+          <a:lumMod val="95000"/>
+        </a:schemeClr>
+      </a:fgClr>
+      <a:bgClr>
+        <a:schemeClr val="lt1"/>
+      </a:bgClr>
+    </a:pattFill>
+    <a:ln w="9525" cap="flat" cmpd="sng" algn="ctr">
+      <a:solidFill>
+        <a:schemeClr val="dk1">
+          <a:lumMod val="15000"/>
+          <a:lumOff val="85000"/>
+        </a:schemeClr>
+      </a:solidFill>
+      <a:round/>
+    </a:ln>
+    <a:effectLst/>
+  </c:spPr>
+  <c:txPr>
+    <a:bodyPr/>
+    <a:lstStyle/>
+    <a:p>
+      <a:pPr>
+        <a:defRPr/>
+      </a:pPr>
+      <a:endParaRPr lang="en-US"/>
+    </a:p>
+  </c:txPr>
+  <c:externalData r:id="rId3">
+    <c:autoUpdate val="0"/>
+  </c:externalData>
+</c:chartSpace>
+</file>
+
+<file path=ppt/charts/chart12.xml><?xml version="1.0" encoding="utf-8"?>
+<c:chartSpace xmlns:c="http://schemas.openxmlformats.org/drawingml/2006/chart" xmlns:a="http://schemas.openxmlformats.org/drawingml/2006/main" xmlns:r="http://schemas.openxmlformats.org/officeDocument/2006/relationships">
+  <c:date1904 val="0"/>
+  <c:lang val="en-US"/>
+  <c:roundedCorners val="0"/>
+  <mc:AlternateContent xmlns:mc="http://schemas.openxmlformats.org/markup-compatibility/2006">
+    <mc:Choice xmlns:c14="http://schemas.microsoft.com/office/drawing/2007/8/2/chart" Requires="c14">
+      <c14:style val="103"/>
+    </mc:Choice>
+    <mc:Fallback>
+      <c:style val="3"/>
+    </mc:Fallback>
+  </mc:AlternateContent>
+  <c:chart>
+    <c:title>
+      <c:tx>
+        <c:rich>
+          <a:bodyPr rot="0" spcFirstLastPara="1" vertOverflow="ellipsis" vert="horz" wrap="square" anchor="ctr" anchorCtr="1"/>
+          <a:lstStyle/>
+          <a:p>
+            <a:pPr>
+              <a:defRPr sz="2200" b="1" i="0" u="none" strike="noStrike" kern="1200" baseline="0">
+                <a:solidFill>
+                  <a:schemeClr val="dk1">
+                    <a:lumMod val="65000"/>
+                    <a:lumOff val="35000"/>
+                  </a:schemeClr>
+                </a:solidFill>
+                <a:latin typeface="+mn-lt"/>
+                <a:ea typeface="+mn-ea"/>
+                <a:cs typeface="+mn-cs"/>
+              </a:defRPr>
+            </a:pPr>
+            <a:r>
+              <a:rPr lang="en-US" dirty="0" err="1" smtClean="0"/>
+              <a:t>SkillE</a:t>
+            </a:r>
+            <a:endParaRPr lang="en-US" dirty="0"/>
+          </a:p>
+        </c:rich>
+      </c:tx>
+      <c:overlay val="0"/>
+      <c:spPr>
+        <a:noFill/>
+        <a:ln>
+          <a:noFill/>
+        </a:ln>
+        <a:effectLst/>
+      </c:spPr>
+      <c:txPr>
+        <a:bodyPr rot="0" spcFirstLastPara="1" vertOverflow="ellipsis" vert="horz" wrap="square" anchor="ctr" anchorCtr="1"/>
+        <a:lstStyle/>
+        <a:p>
+          <a:pPr>
+            <a:defRPr sz="2200" b="1" i="0" u="none" strike="noStrike" kern="1200" baseline="0">
+              <a:solidFill>
+                <a:schemeClr val="dk1">
+                  <a:lumMod val="65000"/>
+                  <a:lumOff val="35000"/>
+                </a:schemeClr>
+              </a:solidFill>
+              <a:latin typeface="+mn-lt"/>
+              <a:ea typeface="+mn-ea"/>
+              <a:cs typeface="+mn-cs"/>
+            </a:defRPr>
+          </a:pPr>
+          <a:endParaRPr lang="en-US"/>
+        </a:p>
+      </c:txPr>
+    </c:title>
+    <c:autoTitleDeleted val="0"/>
+    <c:plotArea>
+      <c:layout/>
+      <c:pieChart>
+        <c:varyColors val="1"/>
+        <c:ser>
+          <c:idx val="0"/>
+          <c:order val="0"/>
+          <c:tx>
+            <c:strRef>
+              <c:f>Sheet1!$B$1</c:f>
+              <c:strCache>
+                <c:ptCount val="1"/>
+                <c:pt idx="0">
+                  <c:v>Sales</c:v>
+                </c:pt>
+              </c:strCache>
+            </c:strRef>
+          </c:tx>
+          <c:dPt>
+            <c:idx val="0"/>
+            <c:bubble3D val="0"/>
+            <c:spPr>
+              <a:solidFill>
+                <a:schemeClr val="accent1">
+                  <a:shade val="53000"/>
+                </a:schemeClr>
+              </a:solidFill>
+              <a:ln>
+                <a:noFill/>
+              </a:ln>
+              <a:effectLst>
+                <a:outerShdw blurRad="317500" algn="ctr" rotWithShape="0">
+                  <a:prstClr val="black">
+                    <a:alpha val="25000"/>
+                  </a:prstClr>
+                </a:outerShdw>
+              </a:effectLst>
+            </c:spPr>
+          </c:dPt>
+          <c:dPt>
+            <c:idx val="1"/>
+            <c:bubble3D val="0"/>
+            <c:spPr>
+              <a:solidFill>
+                <a:schemeClr val="accent1">
+                  <a:shade val="76000"/>
+                </a:schemeClr>
+              </a:solidFill>
+              <a:ln>
+                <a:noFill/>
+              </a:ln>
+              <a:effectLst>
+                <a:outerShdw blurRad="317500" algn="ctr" rotWithShape="0">
+                  <a:prstClr val="black">
+                    <a:alpha val="25000"/>
+                  </a:prstClr>
+                </a:outerShdw>
+              </a:effectLst>
+            </c:spPr>
+          </c:dPt>
+          <c:dLbls>
+            <c:spPr>
+              <a:noFill/>
+              <a:ln>
+                <a:noFill/>
+              </a:ln>
+              <a:effectLst/>
+            </c:spPr>
+            <c:txPr>
+              <a:bodyPr rot="0" spcFirstLastPara="1" vertOverflow="ellipsis" vert="horz" wrap="square" lIns="38100" tIns="19050" rIns="38100" bIns="19050" anchor="ctr" anchorCtr="1">
+                <a:spAutoFit/>
+              </a:bodyPr>
+              <a:lstStyle/>
+              <a:p>
+                <a:pPr>
+                  <a:defRPr sz="1197" b="1" i="0" u="none" strike="noStrike" kern="1200" baseline="0">
+                    <a:solidFill>
+                      <a:schemeClr val="lt1"/>
+                    </a:solidFill>
+                    <a:latin typeface="+mn-lt"/>
+                    <a:ea typeface="+mn-ea"/>
+                    <a:cs typeface="+mn-cs"/>
+                  </a:defRPr>
+                </a:pPr>
+                <a:endParaRPr lang="en-US"/>
+              </a:p>
+            </c:txPr>
+            <c:dLblPos val="inEnd"/>
+            <c:showLegendKey val="0"/>
+            <c:showVal val="0"/>
+            <c:showCatName val="0"/>
+            <c:showSerName val="0"/>
+            <c:showPercent val="1"/>
+            <c:showBubbleSize val="0"/>
+            <c:showLeaderLines val="1"/>
+            <c:leaderLines>
+              <c:spPr>
+                <a:ln w="9525" cap="flat" cmpd="sng" algn="ctr">
+                  <a:solidFill>
+                    <a:schemeClr val="dk1">
+                      <a:lumMod val="35000"/>
+                      <a:lumOff val="65000"/>
+                    </a:schemeClr>
+                  </a:solidFill>
+                  <a:round/>
+                </a:ln>
+                <a:effectLst/>
+              </c:spPr>
+            </c:leaderLines>
+            <c:extLst>
+              <c:ext xmlns:c15="http://schemas.microsoft.com/office/drawing/2012/chart" uri="{CE6537A1-D6FC-4f65-9D91-7224C49458BB}"/>
+            </c:extLst>
+          </c:dLbls>
+          <c:cat>
+            <c:strRef>
+              <c:f>Sheet1!$A$2:$A$3</c:f>
+              <c:strCache>
+                <c:ptCount val="2"/>
+                <c:pt idx="0">
+                  <c:v>Know it (10)</c:v>
+                </c:pt>
+                <c:pt idx="1">
+                  <c:v>Don't know it (35)</c:v>
+                </c:pt>
+              </c:strCache>
+            </c:strRef>
+          </c:cat>
+          <c:val>
+            <c:numRef>
+              <c:f>Sheet1!$B$2:$B$3</c:f>
+              <c:numCache>
+                <c:formatCode>General</c:formatCode>
+                <c:ptCount val="2"/>
+                <c:pt idx="0">
+                  <c:v>10</c:v>
+                </c:pt>
+                <c:pt idx="1">
+                  <c:v>35</c:v>
+                </c:pt>
+              </c:numCache>
+            </c:numRef>
+          </c:val>
+        </c:ser>
+        <c:dLbls>
+          <c:dLblPos val="inEnd"/>
+          <c:showLegendKey val="0"/>
+          <c:showVal val="0"/>
+          <c:showCatName val="0"/>
+          <c:showSerName val="0"/>
+          <c:showPercent val="1"/>
+          <c:showBubbleSize val="0"/>
+          <c:showLeaderLines val="1"/>
+        </c:dLbls>
+        <c:firstSliceAng val="0"/>
+      </c:pieChart>
+      <c:spPr>
+        <a:noFill/>
+        <a:ln>
+          <a:noFill/>
+        </a:ln>
+        <a:effectLst/>
+      </c:spPr>
+    </c:plotArea>
+    <c:legend>
+      <c:legendPos val="b"/>
+      <c:overlay val="0"/>
+      <c:spPr>
+        <a:solidFill>
+          <a:schemeClr val="lt1">
+            <a:alpha val="78000"/>
+          </a:schemeClr>
+        </a:solidFill>
+        <a:ln>
+          <a:noFill/>
+        </a:ln>
+        <a:effectLst/>
+      </c:spPr>
+      <c:txPr>
+        <a:bodyPr rot="0" spcFirstLastPara="1" vertOverflow="ellipsis" vert="horz" wrap="square" anchor="ctr" anchorCtr="1"/>
+        <a:lstStyle/>
+        <a:p>
+          <a:pPr>
+            <a:defRPr sz="1197" b="0" i="0" u="none" strike="noStrike" kern="1200" baseline="0">
+              <a:solidFill>
+                <a:schemeClr val="dk1">
+                  <a:lumMod val="65000"/>
+                  <a:lumOff val="35000"/>
+                </a:schemeClr>
+              </a:solidFill>
+              <a:latin typeface="+mn-lt"/>
+              <a:ea typeface="+mn-ea"/>
+              <a:cs typeface="+mn-cs"/>
+            </a:defRPr>
+          </a:pPr>
+          <a:endParaRPr lang="en-US"/>
+        </a:p>
+      </c:txPr>
+    </c:legend>
+    <c:plotVisOnly val="1"/>
+    <c:dispBlanksAs val="gap"/>
+    <c:showDLblsOverMax val="0"/>
+  </c:chart>
+  <c:spPr>
+    <a:pattFill prst="dkDnDiag">
+      <a:fgClr>
+        <a:schemeClr val="lt1">
+          <a:lumMod val="95000"/>
+        </a:schemeClr>
+      </a:fgClr>
+      <a:bgClr>
+        <a:schemeClr val="lt1"/>
+      </a:bgClr>
+    </a:pattFill>
+    <a:ln w="9525" cap="flat" cmpd="sng" algn="ctr">
+      <a:solidFill>
+        <a:schemeClr val="dk1">
+          <a:lumMod val="15000"/>
+          <a:lumOff val="85000"/>
+        </a:schemeClr>
+      </a:solidFill>
+      <a:round/>
+    </a:ln>
+    <a:effectLst/>
+  </c:spPr>
+  <c:txPr>
+    <a:bodyPr/>
+    <a:lstStyle/>
+    <a:p>
+      <a:pPr>
+        <a:defRPr/>
+      </a:pPr>
+      <a:endParaRPr lang="en-US"/>
+    </a:p>
+  </c:txPr>
+  <c:externalData r:id="rId3">
+    <c:autoUpdate val="0"/>
+  </c:externalData>
+</c:chartSpace>
+</file>
+
+<file path=ppt/charts/chart13.xml><?xml version="1.0" encoding="utf-8"?>
+<c:chartSpace xmlns:c="http://schemas.openxmlformats.org/drawingml/2006/chart" xmlns:a="http://schemas.openxmlformats.org/drawingml/2006/main" xmlns:r="http://schemas.openxmlformats.org/officeDocument/2006/relationships">
+  <c:date1904 val="0"/>
+  <c:lang val="en-US"/>
+  <c:roundedCorners val="0"/>
+  <mc:AlternateContent xmlns:mc="http://schemas.openxmlformats.org/markup-compatibility/2006">
+    <mc:Choice xmlns:c14="http://schemas.microsoft.com/office/drawing/2007/8/2/chart" Requires="c14">
+      <c14:style val="103"/>
+    </mc:Choice>
+    <mc:Fallback>
+      <c:style val="3"/>
+    </mc:Fallback>
+  </mc:AlternateContent>
+  <c:chart>
+    <c:autoTitleDeleted val="1"/>
     <c:plotArea>
       <c:layout/>
       <c:pieChart>
@@ -814,891 +1686,6 @@
 </c:chartSpace>
 </file>
 
-<file path=ppt/charts/chart11.xml><?xml version="1.0" encoding="utf-8"?>
-<c:chartSpace xmlns:c="http://schemas.openxmlformats.org/drawingml/2006/chart" xmlns:a="http://schemas.openxmlformats.org/drawingml/2006/main" xmlns:r="http://schemas.openxmlformats.org/officeDocument/2006/relationships">
-  <c:date1904 val="0"/>
-  <c:lang val="en-US"/>
-  <c:roundedCorners val="0"/>
-  <mc:AlternateContent xmlns:mc="http://schemas.openxmlformats.org/markup-compatibility/2006">
-    <mc:Choice xmlns:c14="http://schemas.microsoft.com/office/drawing/2007/8/2/chart" Requires="c14">
-      <c14:style val="103"/>
-    </mc:Choice>
-    <mc:Fallback>
-      <c:style val="3"/>
-    </mc:Fallback>
-  </mc:AlternateContent>
-  <c:chart>
-    <c:title>
-      <c:tx>
-        <c:rich>
-          <a:bodyPr rot="0" spcFirstLastPara="1" vertOverflow="ellipsis" vert="horz" wrap="square" anchor="ctr" anchorCtr="1"/>
-          <a:lstStyle/>
-          <a:p>
-            <a:pPr>
-              <a:defRPr sz="2200" b="1" i="0" u="none" strike="noStrike" kern="1200" baseline="0">
-                <a:solidFill>
-                  <a:schemeClr val="dk1">
-                    <a:lumMod val="65000"/>
-                    <a:lumOff val="35000"/>
-                  </a:schemeClr>
-                </a:solidFill>
-                <a:latin typeface="+mn-lt"/>
-                <a:ea typeface="+mn-ea"/>
-                <a:cs typeface="+mn-cs"/>
-              </a:defRPr>
-            </a:pPr>
-            <a:r>
-              <a:rPr lang="en-US" dirty="0" err="1" smtClean="0"/>
-              <a:t>SkillF</a:t>
-            </a:r>
-            <a:endParaRPr lang="en-US" dirty="0"/>
-          </a:p>
-        </c:rich>
-      </c:tx>
-      <c:layout/>
-      <c:overlay val="0"/>
-      <c:spPr>
-        <a:noFill/>
-        <a:ln>
-          <a:noFill/>
-        </a:ln>
-        <a:effectLst/>
-      </c:spPr>
-      <c:txPr>
-        <a:bodyPr rot="0" spcFirstLastPara="1" vertOverflow="ellipsis" vert="horz" wrap="square" anchor="ctr" anchorCtr="1"/>
-        <a:lstStyle/>
-        <a:p>
-          <a:pPr>
-            <a:defRPr sz="2200" b="1" i="0" u="none" strike="noStrike" kern="1200" baseline="0">
-              <a:solidFill>
-                <a:schemeClr val="dk1">
-                  <a:lumMod val="65000"/>
-                  <a:lumOff val="35000"/>
-                </a:schemeClr>
-              </a:solidFill>
-              <a:latin typeface="+mn-lt"/>
-              <a:ea typeface="+mn-ea"/>
-              <a:cs typeface="+mn-cs"/>
-            </a:defRPr>
-          </a:pPr>
-          <a:endParaRPr lang="en-US"/>
-        </a:p>
-      </c:txPr>
-    </c:title>
-    <c:autoTitleDeleted val="0"/>
-    <c:plotArea>
-      <c:layout/>
-      <c:pieChart>
-        <c:varyColors val="1"/>
-        <c:ser>
-          <c:idx val="0"/>
-          <c:order val="0"/>
-          <c:tx>
-            <c:strRef>
-              <c:f>Sheet1!$B$1</c:f>
-              <c:strCache>
-                <c:ptCount val="1"/>
-                <c:pt idx="0">
-                  <c:v>Sales</c:v>
-                </c:pt>
-              </c:strCache>
-            </c:strRef>
-          </c:tx>
-          <c:dPt>
-            <c:idx val="0"/>
-            <c:bubble3D val="0"/>
-            <c:spPr>
-              <a:solidFill>
-                <a:schemeClr val="accent1">
-                  <a:shade val="53000"/>
-                </a:schemeClr>
-              </a:solidFill>
-              <a:ln>
-                <a:noFill/>
-              </a:ln>
-              <a:effectLst>
-                <a:outerShdw blurRad="317500" algn="ctr" rotWithShape="0">
-                  <a:prstClr val="black">
-                    <a:alpha val="25000"/>
-                  </a:prstClr>
-                </a:outerShdw>
-              </a:effectLst>
-            </c:spPr>
-          </c:dPt>
-          <c:dPt>
-            <c:idx val="1"/>
-            <c:bubble3D val="0"/>
-            <c:spPr>
-              <a:solidFill>
-                <a:schemeClr val="accent1">
-                  <a:shade val="76000"/>
-                </a:schemeClr>
-              </a:solidFill>
-              <a:ln>
-                <a:noFill/>
-              </a:ln>
-              <a:effectLst>
-                <a:outerShdw blurRad="317500" algn="ctr" rotWithShape="0">
-                  <a:prstClr val="black">
-                    <a:alpha val="25000"/>
-                  </a:prstClr>
-                </a:outerShdw>
-              </a:effectLst>
-            </c:spPr>
-          </c:dPt>
-          <c:dLbls>
-            <c:spPr>
-              <a:noFill/>
-              <a:ln>
-                <a:noFill/>
-              </a:ln>
-              <a:effectLst/>
-            </c:spPr>
-            <c:txPr>
-              <a:bodyPr rot="0" spcFirstLastPara="1" vertOverflow="ellipsis" vert="horz" wrap="square" lIns="38100" tIns="19050" rIns="38100" bIns="19050" anchor="ctr" anchorCtr="1">
-                <a:spAutoFit/>
-              </a:bodyPr>
-              <a:lstStyle/>
-              <a:p>
-                <a:pPr>
-                  <a:defRPr sz="1197" b="1" i="0" u="none" strike="noStrike" kern="1200" baseline="0">
-                    <a:solidFill>
-                      <a:schemeClr val="lt1"/>
-                    </a:solidFill>
-                    <a:latin typeface="+mn-lt"/>
-                    <a:ea typeface="+mn-ea"/>
-                    <a:cs typeface="+mn-cs"/>
-                  </a:defRPr>
-                </a:pPr>
-                <a:endParaRPr lang="en-US"/>
-              </a:p>
-            </c:txPr>
-            <c:dLblPos val="inEnd"/>
-            <c:showLegendKey val="0"/>
-            <c:showVal val="0"/>
-            <c:showCatName val="0"/>
-            <c:showSerName val="0"/>
-            <c:showPercent val="1"/>
-            <c:showBubbleSize val="0"/>
-            <c:showLeaderLines val="1"/>
-            <c:leaderLines>
-              <c:spPr>
-                <a:ln w="9525" cap="flat" cmpd="sng" algn="ctr">
-                  <a:solidFill>
-                    <a:schemeClr val="dk1">
-                      <a:lumMod val="35000"/>
-                      <a:lumOff val="65000"/>
-                    </a:schemeClr>
-                  </a:solidFill>
-                  <a:round/>
-                </a:ln>
-                <a:effectLst/>
-              </c:spPr>
-            </c:leaderLines>
-            <c:extLst>
-              <c:ext xmlns:c15="http://schemas.microsoft.com/office/drawing/2012/chart" uri="{CE6537A1-D6FC-4f65-9D91-7224C49458BB}">
-                <c15:layout/>
-              </c:ext>
-            </c:extLst>
-          </c:dLbls>
-          <c:cat>
-            <c:strRef>
-              <c:f>Sheet1!$A$2:$A$3</c:f>
-              <c:strCache>
-                <c:ptCount val="2"/>
-                <c:pt idx="0">
-                  <c:v>Know it (30)</c:v>
-                </c:pt>
-                <c:pt idx="1">
-                  <c:v>Don't know it(15)</c:v>
-                </c:pt>
-              </c:strCache>
-            </c:strRef>
-          </c:cat>
-          <c:val>
-            <c:numRef>
-              <c:f>Sheet1!$B$2:$B$3</c:f>
-              <c:numCache>
-                <c:formatCode>General</c:formatCode>
-                <c:ptCount val="2"/>
-                <c:pt idx="0">
-                  <c:v>30</c:v>
-                </c:pt>
-                <c:pt idx="1">
-                  <c:v>15</c:v>
-                </c:pt>
-              </c:numCache>
-            </c:numRef>
-          </c:val>
-        </c:ser>
-        <c:dLbls>
-          <c:dLblPos val="inEnd"/>
-          <c:showLegendKey val="0"/>
-          <c:showVal val="0"/>
-          <c:showCatName val="0"/>
-          <c:showSerName val="0"/>
-          <c:showPercent val="1"/>
-          <c:showBubbleSize val="0"/>
-          <c:showLeaderLines val="1"/>
-        </c:dLbls>
-        <c:firstSliceAng val="0"/>
-      </c:pieChart>
-      <c:spPr>
-        <a:noFill/>
-        <a:ln>
-          <a:noFill/>
-        </a:ln>
-        <a:effectLst/>
-      </c:spPr>
-    </c:plotArea>
-    <c:legend>
-      <c:legendPos val="b"/>
-      <c:layout/>
-      <c:overlay val="0"/>
-      <c:spPr>
-        <a:solidFill>
-          <a:schemeClr val="lt1">
-            <a:alpha val="78000"/>
-          </a:schemeClr>
-        </a:solidFill>
-        <a:ln>
-          <a:noFill/>
-        </a:ln>
-        <a:effectLst/>
-      </c:spPr>
-      <c:txPr>
-        <a:bodyPr rot="0" spcFirstLastPara="1" vertOverflow="ellipsis" vert="horz" wrap="square" anchor="ctr" anchorCtr="1"/>
-        <a:lstStyle/>
-        <a:p>
-          <a:pPr>
-            <a:defRPr sz="1197" b="0" i="0" u="none" strike="noStrike" kern="1200" baseline="0">
-              <a:solidFill>
-                <a:schemeClr val="dk1">
-                  <a:lumMod val="65000"/>
-                  <a:lumOff val="35000"/>
-                </a:schemeClr>
-              </a:solidFill>
-              <a:latin typeface="+mn-lt"/>
-              <a:ea typeface="+mn-ea"/>
-              <a:cs typeface="+mn-cs"/>
-            </a:defRPr>
-          </a:pPr>
-          <a:endParaRPr lang="en-US"/>
-        </a:p>
-      </c:txPr>
-    </c:legend>
-    <c:plotVisOnly val="1"/>
-    <c:dispBlanksAs val="gap"/>
-    <c:showDLblsOverMax val="0"/>
-  </c:chart>
-  <c:spPr>
-    <a:pattFill prst="dkDnDiag">
-      <a:fgClr>
-        <a:schemeClr val="lt1">
-          <a:lumMod val="95000"/>
-        </a:schemeClr>
-      </a:fgClr>
-      <a:bgClr>
-        <a:schemeClr val="lt1"/>
-      </a:bgClr>
-    </a:pattFill>
-    <a:ln w="9525" cap="flat" cmpd="sng" algn="ctr">
-      <a:solidFill>
-        <a:schemeClr val="dk1">
-          <a:lumMod val="15000"/>
-          <a:lumOff val="85000"/>
-        </a:schemeClr>
-      </a:solidFill>
-      <a:round/>
-    </a:ln>
-    <a:effectLst/>
-  </c:spPr>
-  <c:txPr>
-    <a:bodyPr/>
-    <a:lstStyle/>
-    <a:p>
-      <a:pPr>
-        <a:defRPr/>
-      </a:pPr>
-      <a:endParaRPr lang="en-US"/>
-    </a:p>
-  </c:txPr>
-  <c:externalData r:id="rId3">
-    <c:autoUpdate val="0"/>
-  </c:externalData>
-</c:chartSpace>
-</file>
-
-<file path=ppt/charts/chart12.xml><?xml version="1.0" encoding="utf-8"?>
-<c:chartSpace xmlns:c="http://schemas.openxmlformats.org/drawingml/2006/chart" xmlns:a="http://schemas.openxmlformats.org/drawingml/2006/main" xmlns:r="http://schemas.openxmlformats.org/officeDocument/2006/relationships">
-  <c:date1904 val="0"/>
-  <c:lang val="en-US"/>
-  <c:roundedCorners val="0"/>
-  <mc:AlternateContent xmlns:mc="http://schemas.openxmlformats.org/markup-compatibility/2006">
-    <mc:Choice xmlns:c14="http://schemas.microsoft.com/office/drawing/2007/8/2/chart" Requires="c14">
-      <c14:style val="103"/>
-    </mc:Choice>
-    <mc:Fallback>
-      <c:style val="3"/>
-    </mc:Fallback>
-  </mc:AlternateContent>
-  <c:chart>
-    <c:title>
-      <c:tx>
-        <c:rich>
-          <a:bodyPr rot="0" spcFirstLastPara="1" vertOverflow="ellipsis" vert="horz" wrap="square" anchor="ctr" anchorCtr="1"/>
-          <a:lstStyle/>
-          <a:p>
-            <a:pPr>
-              <a:defRPr sz="2200" b="1" i="0" u="none" strike="noStrike" kern="1200" baseline="0">
-                <a:solidFill>
-                  <a:schemeClr val="dk1">
-                    <a:lumMod val="65000"/>
-                    <a:lumOff val="35000"/>
-                  </a:schemeClr>
-                </a:solidFill>
-                <a:latin typeface="+mn-lt"/>
-                <a:ea typeface="+mn-ea"/>
-                <a:cs typeface="+mn-cs"/>
-              </a:defRPr>
-            </a:pPr>
-            <a:r>
-              <a:rPr lang="en-US" dirty="0" err="1" smtClean="0"/>
-              <a:t>SkillE</a:t>
-            </a:r>
-            <a:endParaRPr lang="en-US" dirty="0"/>
-          </a:p>
-        </c:rich>
-      </c:tx>
-      <c:layout/>
-      <c:overlay val="0"/>
-      <c:spPr>
-        <a:noFill/>
-        <a:ln>
-          <a:noFill/>
-        </a:ln>
-        <a:effectLst/>
-      </c:spPr>
-      <c:txPr>
-        <a:bodyPr rot="0" spcFirstLastPara="1" vertOverflow="ellipsis" vert="horz" wrap="square" anchor="ctr" anchorCtr="1"/>
-        <a:lstStyle/>
-        <a:p>
-          <a:pPr>
-            <a:defRPr sz="2200" b="1" i="0" u="none" strike="noStrike" kern="1200" baseline="0">
-              <a:solidFill>
-                <a:schemeClr val="dk1">
-                  <a:lumMod val="65000"/>
-                  <a:lumOff val="35000"/>
-                </a:schemeClr>
-              </a:solidFill>
-              <a:latin typeface="+mn-lt"/>
-              <a:ea typeface="+mn-ea"/>
-              <a:cs typeface="+mn-cs"/>
-            </a:defRPr>
-          </a:pPr>
-          <a:endParaRPr lang="en-US"/>
-        </a:p>
-      </c:txPr>
-    </c:title>
-    <c:autoTitleDeleted val="0"/>
-    <c:plotArea>
-      <c:layout/>
-      <c:pieChart>
-        <c:varyColors val="1"/>
-        <c:ser>
-          <c:idx val="0"/>
-          <c:order val="0"/>
-          <c:tx>
-            <c:strRef>
-              <c:f>Sheet1!$B$1</c:f>
-              <c:strCache>
-                <c:ptCount val="1"/>
-                <c:pt idx="0">
-                  <c:v>Sales</c:v>
-                </c:pt>
-              </c:strCache>
-            </c:strRef>
-          </c:tx>
-          <c:dPt>
-            <c:idx val="0"/>
-            <c:bubble3D val="0"/>
-            <c:spPr>
-              <a:solidFill>
-                <a:schemeClr val="accent1">
-                  <a:shade val="53000"/>
-                </a:schemeClr>
-              </a:solidFill>
-              <a:ln>
-                <a:noFill/>
-              </a:ln>
-              <a:effectLst>
-                <a:outerShdw blurRad="317500" algn="ctr" rotWithShape="0">
-                  <a:prstClr val="black">
-                    <a:alpha val="25000"/>
-                  </a:prstClr>
-                </a:outerShdw>
-              </a:effectLst>
-            </c:spPr>
-          </c:dPt>
-          <c:dPt>
-            <c:idx val="1"/>
-            <c:bubble3D val="0"/>
-            <c:spPr>
-              <a:solidFill>
-                <a:schemeClr val="accent1">
-                  <a:shade val="76000"/>
-                </a:schemeClr>
-              </a:solidFill>
-              <a:ln>
-                <a:noFill/>
-              </a:ln>
-              <a:effectLst>
-                <a:outerShdw blurRad="317500" algn="ctr" rotWithShape="0">
-                  <a:prstClr val="black">
-                    <a:alpha val="25000"/>
-                  </a:prstClr>
-                </a:outerShdw>
-              </a:effectLst>
-            </c:spPr>
-          </c:dPt>
-          <c:dLbls>
-            <c:spPr>
-              <a:noFill/>
-              <a:ln>
-                <a:noFill/>
-              </a:ln>
-              <a:effectLst/>
-            </c:spPr>
-            <c:txPr>
-              <a:bodyPr rot="0" spcFirstLastPara="1" vertOverflow="ellipsis" vert="horz" wrap="square" lIns="38100" tIns="19050" rIns="38100" bIns="19050" anchor="ctr" anchorCtr="1">
-                <a:spAutoFit/>
-              </a:bodyPr>
-              <a:lstStyle/>
-              <a:p>
-                <a:pPr>
-                  <a:defRPr sz="1197" b="1" i="0" u="none" strike="noStrike" kern="1200" baseline="0">
-                    <a:solidFill>
-                      <a:schemeClr val="lt1"/>
-                    </a:solidFill>
-                    <a:latin typeface="+mn-lt"/>
-                    <a:ea typeface="+mn-ea"/>
-                    <a:cs typeface="+mn-cs"/>
-                  </a:defRPr>
-                </a:pPr>
-                <a:endParaRPr lang="en-US"/>
-              </a:p>
-            </c:txPr>
-            <c:dLblPos val="inEnd"/>
-            <c:showLegendKey val="0"/>
-            <c:showVal val="0"/>
-            <c:showCatName val="0"/>
-            <c:showSerName val="0"/>
-            <c:showPercent val="1"/>
-            <c:showBubbleSize val="0"/>
-            <c:showLeaderLines val="1"/>
-            <c:leaderLines>
-              <c:spPr>
-                <a:ln w="9525" cap="flat" cmpd="sng" algn="ctr">
-                  <a:solidFill>
-                    <a:schemeClr val="dk1">
-                      <a:lumMod val="35000"/>
-                      <a:lumOff val="65000"/>
-                    </a:schemeClr>
-                  </a:solidFill>
-                  <a:round/>
-                </a:ln>
-                <a:effectLst/>
-              </c:spPr>
-            </c:leaderLines>
-            <c:extLst>
-              <c:ext xmlns:c15="http://schemas.microsoft.com/office/drawing/2012/chart" uri="{CE6537A1-D6FC-4f65-9D91-7224C49458BB}">
-                <c15:layout/>
-              </c:ext>
-            </c:extLst>
-          </c:dLbls>
-          <c:cat>
-            <c:strRef>
-              <c:f>Sheet1!$A$2:$A$3</c:f>
-              <c:strCache>
-                <c:ptCount val="2"/>
-                <c:pt idx="0">
-                  <c:v>Know it (10)</c:v>
-                </c:pt>
-                <c:pt idx="1">
-                  <c:v>Don't know it (35)</c:v>
-                </c:pt>
-              </c:strCache>
-            </c:strRef>
-          </c:cat>
-          <c:val>
-            <c:numRef>
-              <c:f>Sheet1!$B$2:$B$3</c:f>
-              <c:numCache>
-                <c:formatCode>General</c:formatCode>
-                <c:ptCount val="2"/>
-                <c:pt idx="0">
-                  <c:v>10</c:v>
-                </c:pt>
-                <c:pt idx="1">
-                  <c:v>35</c:v>
-                </c:pt>
-              </c:numCache>
-            </c:numRef>
-          </c:val>
-        </c:ser>
-        <c:dLbls>
-          <c:dLblPos val="inEnd"/>
-          <c:showLegendKey val="0"/>
-          <c:showVal val="0"/>
-          <c:showCatName val="0"/>
-          <c:showSerName val="0"/>
-          <c:showPercent val="1"/>
-          <c:showBubbleSize val="0"/>
-          <c:showLeaderLines val="1"/>
-        </c:dLbls>
-        <c:firstSliceAng val="0"/>
-      </c:pieChart>
-      <c:spPr>
-        <a:noFill/>
-        <a:ln>
-          <a:noFill/>
-        </a:ln>
-        <a:effectLst/>
-      </c:spPr>
-    </c:plotArea>
-    <c:legend>
-      <c:legendPos val="b"/>
-      <c:layout/>
-      <c:overlay val="0"/>
-      <c:spPr>
-        <a:solidFill>
-          <a:schemeClr val="lt1">
-            <a:alpha val="78000"/>
-          </a:schemeClr>
-        </a:solidFill>
-        <a:ln>
-          <a:noFill/>
-        </a:ln>
-        <a:effectLst/>
-      </c:spPr>
-      <c:txPr>
-        <a:bodyPr rot="0" spcFirstLastPara="1" vertOverflow="ellipsis" vert="horz" wrap="square" anchor="ctr" anchorCtr="1"/>
-        <a:lstStyle/>
-        <a:p>
-          <a:pPr>
-            <a:defRPr sz="1197" b="0" i="0" u="none" strike="noStrike" kern="1200" baseline="0">
-              <a:solidFill>
-                <a:schemeClr val="dk1">
-                  <a:lumMod val="65000"/>
-                  <a:lumOff val="35000"/>
-                </a:schemeClr>
-              </a:solidFill>
-              <a:latin typeface="+mn-lt"/>
-              <a:ea typeface="+mn-ea"/>
-              <a:cs typeface="+mn-cs"/>
-            </a:defRPr>
-          </a:pPr>
-          <a:endParaRPr lang="en-US"/>
-        </a:p>
-      </c:txPr>
-    </c:legend>
-    <c:plotVisOnly val="1"/>
-    <c:dispBlanksAs val="gap"/>
-    <c:showDLblsOverMax val="0"/>
-  </c:chart>
-  <c:spPr>
-    <a:pattFill prst="dkDnDiag">
-      <a:fgClr>
-        <a:schemeClr val="lt1">
-          <a:lumMod val="95000"/>
-        </a:schemeClr>
-      </a:fgClr>
-      <a:bgClr>
-        <a:schemeClr val="lt1"/>
-      </a:bgClr>
-    </a:pattFill>
-    <a:ln w="9525" cap="flat" cmpd="sng" algn="ctr">
-      <a:solidFill>
-        <a:schemeClr val="dk1">
-          <a:lumMod val="15000"/>
-          <a:lumOff val="85000"/>
-        </a:schemeClr>
-      </a:solidFill>
-      <a:round/>
-    </a:ln>
-    <a:effectLst/>
-  </c:spPr>
-  <c:txPr>
-    <a:bodyPr/>
-    <a:lstStyle/>
-    <a:p>
-      <a:pPr>
-        <a:defRPr/>
-      </a:pPr>
-      <a:endParaRPr lang="en-US"/>
-    </a:p>
-  </c:txPr>
-  <c:externalData r:id="rId3">
-    <c:autoUpdate val="0"/>
-  </c:externalData>
-</c:chartSpace>
-</file>
-
-<file path=ppt/charts/chart13.xml><?xml version="1.0" encoding="utf-8"?>
-<c:chartSpace xmlns:c="http://schemas.openxmlformats.org/drawingml/2006/chart" xmlns:a="http://schemas.openxmlformats.org/drawingml/2006/main" xmlns:r="http://schemas.openxmlformats.org/officeDocument/2006/relationships">
-  <c:date1904 val="0"/>
-  <c:lang val="en-US"/>
-  <c:roundedCorners val="0"/>
-  <mc:AlternateContent xmlns:mc="http://schemas.openxmlformats.org/markup-compatibility/2006">
-    <mc:Choice xmlns:c14="http://schemas.microsoft.com/office/drawing/2007/8/2/chart" Requires="c14">
-      <c14:style val="103"/>
-    </mc:Choice>
-    <mc:Fallback>
-      <c:style val="3"/>
-    </mc:Fallback>
-  </mc:AlternateContent>
-  <c:chart>
-    <c:autoTitleDeleted val="1"/>
-    <c:plotArea>
-      <c:layout/>
-      <c:pieChart>
-        <c:varyColors val="1"/>
-        <c:ser>
-          <c:idx val="0"/>
-          <c:order val="0"/>
-          <c:tx>
-            <c:strRef>
-              <c:f>Sheet1!$B$1</c:f>
-              <c:strCache>
-                <c:ptCount val="1"/>
-                <c:pt idx="0">
-                  <c:v>Sales</c:v>
-                </c:pt>
-              </c:strCache>
-            </c:strRef>
-          </c:tx>
-          <c:dPt>
-            <c:idx val="0"/>
-            <c:bubble3D val="0"/>
-            <c:spPr>
-              <a:solidFill>
-                <a:schemeClr val="accent1">
-                  <a:shade val="53000"/>
-                </a:schemeClr>
-              </a:solidFill>
-              <a:ln>
-                <a:noFill/>
-              </a:ln>
-              <a:effectLst>
-                <a:outerShdw blurRad="317500" algn="ctr" rotWithShape="0">
-                  <a:prstClr val="black">
-                    <a:alpha val="25000"/>
-                  </a:prstClr>
-                </a:outerShdw>
-              </a:effectLst>
-            </c:spPr>
-          </c:dPt>
-          <c:dPt>
-            <c:idx val="1"/>
-            <c:bubble3D val="0"/>
-            <c:spPr>
-              <a:solidFill>
-                <a:schemeClr val="accent1">
-                  <a:shade val="76000"/>
-                </a:schemeClr>
-              </a:solidFill>
-              <a:ln>
-                <a:noFill/>
-              </a:ln>
-              <a:effectLst>
-                <a:outerShdw blurRad="317500" algn="ctr" rotWithShape="0">
-                  <a:prstClr val="black">
-                    <a:alpha val="25000"/>
-                  </a:prstClr>
-                </a:outerShdw>
-              </a:effectLst>
-            </c:spPr>
-          </c:dPt>
-          <c:dLbls>
-            <c:spPr>
-              <a:noFill/>
-              <a:ln>
-                <a:noFill/>
-              </a:ln>
-              <a:effectLst/>
-            </c:spPr>
-            <c:txPr>
-              <a:bodyPr rot="0" spcFirstLastPara="1" vertOverflow="ellipsis" vert="horz" wrap="square" lIns="38100" tIns="19050" rIns="38100" bIns="19050" anchor="ctr" anchorCtr="1">
-                <a:spAutoFit/>
-              </a:bodyPr>
-              <a:lstStyle/>
-              <a:p>
-                <a:pPr>
-                  <a:defRPr sz="1197" b="1" i="0" u="none" strike="noStrike" kern="1200" baseline="0">
-                    <a:solidFill>
-                      <a:schemeClr val="lt1"/>
-                    </a:solidFill>
-                    <a:latin typeface="+mn-lt"/>
-                    <a:ea typeface="+mn-ea"/>
-                    <a:cs typeface="+mn-cs"/>
-                  </a:defRPr>
-                </a:pPr>
-                <a:endParaRPr lang="en-US"/>
-              </a:p>
-            </c:txPr>
-            <c:dLblPos val="inEnd"/>
-            <c:showLegendKey val="0"/>
-            <c:showVal val="0"/>
-            <c:showCatName val="0"/>
-            <c:showSerName val="0"/>
-            <c:showPercent val="1"/>
-            <c:showBubbleSize val="0"/>
-            <c:showLeaderLines val="1"/>
-            <c:leaderLines>
-              <c:spPr>
-                <a:ln w="9525" cap="flat" cmpd="sng" algn="ctr">
-                  <a:solidFill>
-                    <a:schemeClr val="dk1">
-                      <a:lumMod val="35000"/>
-                      <a:lumOff val="65000"/>
-                    </a:schemeClr>
-                  </a:solidFill>
-                  <a:round/>
-                </a:ln>
-                <a:effectLst/>
-              </c:spPr>
-            </c:leaderLines>
-            <c:extLst>
-              <c:ext xmlns:c15="http://schemas.microsoft.com/office/drawing/2012/chart" uri="{CE6537A1-D6FC-4f65-9D91-7224C49458BB}"/>
-            </c:extLst>
-          </c:dLbls>
-          <c:cat>
-            <c:strRef>
-              <c:f>Sheet1!$A$2:$A$3</c:f>
-              <c:strCache>
-                <c:ptCount val="2"/>
-                <c:pt idx="0">
-                  <c:v>Know it (3)</c:v>
-                </c:pt>
-                <c:pt idx="1">
-                  <c:v>Don't know it (42)</c:v>
-                </c:pt>
-              </c:strCache>
-            </c:strRef>
-          </c:cat>
-          <c:val>
-            <c:numRef>
-              <c:f>Sheet1!$B$2:$B$3</c:f>
-              <c:numCache>
-                <c:formatCode>General</c:formatCode>
-                <c:ptCount val="2"/>
-                <c:pt idx="0">
-                  <c:v>3</c:v>
-                </c:pt>
-                <c:pt idx="1">
-                  <c:v>42</c:v>
-                </c:pt>
-              </c:numCache>
-            </c:numRef>
-          </c:val>
-        </c:ser>
-        <c:dLbls>
-          <c:dLblPos val="inEnd"/>
-          <c:showLegendKey val="0"/>
-          <c:showVal val="0"/>
-          <c:showCatName val="0"/>
-          <c:showSerName val="0"/>
-          <c:showPercent val="1"/>
-          <c:showBubbleSize val="0"/>
-          <c:showLeaderLines val="1"/>
-        </c:dLbls>
-        <c:firstSliceAng val="0"/>
-      </c:pieChart>
-      <c:spPr>
-        <a:noFill/>
-        <a:ln>
-          <a:noFill/>
-        </a:ln>
-        <a:effectLst/>
-      </c:spPr>
-    </c:plotArea>
-    <c:legend>
-      <c:legendPos val="b"/>
-      <c:overlay val="0"/>
-      <c:spPr>
-        <a:solidFill>
-          <a:schemeClr val="lt1">
-            <a:alpha val="78000"/>
-          </a:schemeClr>
-        </a:solidFill>
-        <a:ln>
-          <a:noFill/>
-        </a:ln>
-        <a:effectLst/>
-      </c:spPr>
-      <c:txPr>
-        <a:bodyPr rot="0" spcFirstLastPara="1" vertOverflow="ellipsis" vert="horz" wrap="square" anchor="ctr" anchorCtr="1"/>
-        <a:lstStyle/>
-        <a:p>
-          <a:pPr>
-            <a:defRPr sz="1197" b="0" i="0" u="none" strike="noStrike" kern="1200" baseline="0">
-              <a:solidFill>
-                <a:schemeClr val="dk1">
-                  <a:lumMod val="65000"/>
-                  <a:lumOff val="35000"/>
-                </a:schemeClr>
-              </a:solidFill>
-              <a:latin typeface="+mn-lt"/>
-              <a:ea typeface="+mn-ea"/>
-              <a:cs typeface="+mn-cs"/>
-            </a:defRPr>
-          </a:pPr>
-          <a:endParaRPr lang="en-US"/>
-        </a:p>
-      </c:txPr>
-    </c:legend>
-    <c:plotVisOnly val="1"/>
-    <c:dispBlanksAs val="gap"/>
-    <c:showDLblsOverMax val="0"/>
-  </c:chart>
-  <c:spPr>
-    <a:pattFill prst="dkDnDiag">
-      <a:fgClr>
-        <a:schemeClr val="lt1">
-          <a:lumMod val="95000"/>
-        </a:schemeClr>
-      </a:fgClr>
-      <a:bgClr>
-        <a:schemeClr val="lt1"/>
-      </a:bgClr>
-    </a:pattFill>
-    <a:ln w="9525" cap="flat" cmpd="sng" algn="ctr">
-      <a:solidFill>
-        <a:schemeClr val="dk1">
-          <a:lumMod val="15000"/>
-          <a:lumOff val="85000"/>
-        </a:schemeClr>
-      </a:solidFill>
-      <a:round/>
-    </a:ln>
-    <a:effectLst/>
-  </c:spPr>
-  <c:txPr>
-    <a:bodyPr/>
-    <a:lstStyle/>
-    <a:p>
-      <a:pPr>
-        <a:defRPr/>
-      </a:pPr>
-      <a:endParaRPr lang="en-US"/>
-    </a:p>
-  </c:txPr>
-  <c:externalData r:id="rId3">
-    <c:autoUpdate val="0"/>
-  </c:externalData>
-</c:chartSpace>
-</file>
-
 <file path=ppt/charts/chart2.xml><?xml version="1.0" encoding="utf-8"?>
 <c:chartSpace xmlns:c="http://schemas.openxmlformats.org/drawingml/2006/chart" xmlns:a="http://schemas.openxmlformats.org/drawingml/2006/main" xmlns:r="http://schemas.openxmlformats.org/officeDocument/2006/relationships">
   <c:date1904 val="0"/>
@@ -1740,7 +1727,6 @@
           </a:p>
         </c:rich>
       </c:tx>
-      <c:layout/>
       <c:overlay val="0"/>
       <c:spPr>
         <a:noFill/>
@@ -1900,9 +1886,7 @@
               </c:spPr>
             </c:leaderLines>
             <c:extLst>
-              <c:ext xmlns:c15="http://schemas.microsoft.com/office/drawing/2012/chart" uri="{CE6537A1-D6FC-4f65-9D91-7224C49458BB}">
-                <c15:layout/>
-              </c:ext>
+              <c:ext xmlns:c15="http://schemas.microsoft.com/office/drawing/2012/chart" uri="{CE6537A1-D6FC-4f65-9D91-7224C49458BB}"/>
             </c:extLst>
           </c:dLbls>
           <c:cat>
@@ -1963,7 +1947,6 @@
     </c:plotArea>
     <c:legend>
       <c:legendPos val="b"/>
-      <c:layout/>
       <c:overlay val="0"/>
       <c:spPr>
         <a:solidFill>
@@ -2080,7 +2063,6 @@
           </a:p>
         </c:rich>
       </c:tx>
-      <c:layout/>
       <c:overlay val="0"/>
       <c:spPr>
         <a:noFill/>
@@ -2240,9 +2222,7 @@
               </c:spPr>
             </c:leaderLines>
             <c:extLst>
-              <c:ext xmlns:c15="http://schemas.microsoft.com/office/drawing/2012/chart" uri="{CE6537A1-D6FC-4f65-9D91-7224C49458BB}">
-                <c15:layout/>
-              </c:ext>
+              <c:ext xmlns:c15="http://schemas.microsoft.com/office/drawing/2012/chart" uri="{CE6537A1-D6FC-4f65-9D91-7224C49458BB}"/>
             </c:extLst>
           </c:dLbls>
           <c:cat>
@@ -2303,7 +2283,6 @@
     </c:plotArea>
     <c:legend>
       <c:legendPos val="b"/>
-      <c:layout/>
       <c:overlay val="0"/>
       <c:spPr>
         <a:solidFill>
@@ -2420,7 +2399,6 @@
           </a:p>
         </c:rich>
       </c:tx>
-      <c:layout/>
       <c:overlay val="0"/>
       <c:spPr>
         <a:noFill/>
@@ -2561,9 +2539,7 @@
               </c:spPr>
             </c:leaderLines>
             <c:extLst>
-              <c:ext xmlns:c15="http://schemas.microsoft.com/office/drawing/2012/chart" uri="{CE6537A1-D6FC-4f65-9D91-7224C49458BB}">
-                <c15:layout/>
-              </c:ext>
+              <c:ext xmlns:c15="http://schemas.microsoft.com/office/drawing/2012/chart" uri="{CE6537A1-D6FC-4f65-9D91-7224C49458BB}"/>
             </c:extLst>
           </c:dLbls>
           <c:cat>
@@ -2618,7 +2594,6 @@
     </c:plotArea>
     <c:legend>
       <c:legendPos val="b"/>
-      <c:layout/>
       <c:overlay val="0"/>
       <c:spPr>
         <a:solidFill>
@@ -2735,7 +2710,6 @@
           </a:p>
         </c:rich>
       </c:tx>
-      <c:layout/>
       <c:overlay val="0"/>
       <c:spPr>
         <a:noFill/>
@@ -2937,9 +2911,7 @@
               </c:spPr>
             </c:leaderLines>
             <c:extLst>
-              <c:ext xmlns:c15="http://schemas.microsoft.com/office/drawing/2012/chart" uri="{CE6537A1-D6FC-4f65-9D91-7224C49458BB}">
-                <c15:layout/>
-              </c:ext>
+              <c:ext xmlns:c15="http://schemas.microsoft.com/office/drawing/2012/chart" uri="{CE6537A1-D6FC-4f65-9D91-7224C49458BB}"/>
             </c:extLst>
           </c:dLbls>
           <c:cat>
@@ -3012,7 +2984,6 @@
     </c:plotArea>
     <c:legend>
       <c:legendPos val="b"/>
-      <c:layout/>
       <c:overlay val="0"/>
       <c:spPr>
         <a:solidFill>
@@ -3466,7 +3437,6 @@
           </a:p>
         </c:rich>
       </c:tx>
-      <c:layout/>
       <c:overlay val="0"/>
       <c:spPr>
         <a:noFill/>
@@ -3607,9 +3577,7 @@
               </c:spPr>
             </c:leaderLines>
             <c:extLst>
-              <c:ext xmlns:c15="http://schemas.microsoft.com/office/drawing/2012/chart" uri="{CE6537A1-D6FC-4f65-9D91-7224C49458BB}">
-                <c15:layout/>
-              </c:ext>
+              <c:ext xmlns:c15="http://schemas.microsoft.com/office/drawing/2012/chart" uri="{CE6537A1-D6FC-4f65-9D91-7224C49458BB}"/>
             </c:extLst>
           </c:dLbls>
           <c:cat>
@@ -3664,7 +3632,6 @@
     </c:plotArea>
     <c:legend>
       <c:legendPos val="b"/>
-      <c:layout/>
       <c:overlay val="0"/>
       <c:spPr>
         <a:solidFill>
@@ -3781,7 +3748,6 @@
           </a:p>
         </c:rich>
       </c:tx>
-      <c:layout/>
       <c:overlay val="0"/>
       <c:spPr>
         <a:noFill/>
@@ -3922,9 +3888,7 @@
               </c:spPr>
             </c:leaderLines>
             <c:extLst>
-              <c:ext xmlns:c15="http://schemas.microsoft.com/office/drawing/2012/chart" uri="{CE6537A1-D6FC-4f65-9D91-7224C49458BB}">
-                <c15:layout/>
-              </c:ext>
+              <c:ext xmlns:c15="http://schemas.microsoft.com/office/drawing/2012/chart" uri="{CE6537A1-D6FC-4f65-9D91-7224C49458BB}"/>
             </c:extLst>
           </c:dLbls>
           <c:cat>
@@ -3979,7 +3943,6 @@
     </c:plotArea>
     <c:legend>
       <c:legendPos val="b"/>
-      <c:layout/>
       <c:overlay val="0"/>
       <c:spPr>
         <a:solidFill>
@@ -4096,7 +4059,6 @@
           </a:p>
         </c:rich>
       </c:tx>
-      <c:layout/>
       <c:overlay val="0"/>
       <c:spPr>
         <a:noFill/>
@@ -4237,9 +4199,7 @@
               </c:spPr>
             </c:leaderLines>
             <c:extLst>
-              <c:ext xmlns:c15="http://schemas.microsoft.com/office/drawing/2012/chart" uri="{CE6537A1-D6FC-4f65-9D91-7224C49458BB}">
-                <c15:layout/>
-              </c:ext>
+              <c:ext xmlns:c15="http://schemas.microsoft.com/office/drawing/2012/chart" uri="{CE6537A1-D6FC-4f65-9D91-7224C49458BB}"/>
             </c:extLst>
           </c:dLbls>
           <c:cat>
@@ -4294,7 +4254,6 @@
     </c:plotArea>
     <c:legend>
       <c:legendPos val="b"/>
-      <c:layout/>
       <c:overlay val="0"/>
       <c:spPr>
         <a:solidFill>
@@ -11482,7 +11441,7 @@
           <a:p>
             <a:fld id="{7FF28D8F-E26C-4A8F-BDE7-9CA7A1C6151D}" type="datetimeFigureOut">
               <a:rPr lang="en-US" smtClean="0"/>
-              <a:t>6/2/2016</a:t>
+              <a:t>6/5/2016</a:t>
             </a:fld>
             <a:endParaRPr lang="en-US"/>
           </a:p>
@@ -11652,7 +11611,7 @@
           <a:p>
             <a:fld id="{7FF28D8F-E26C-4A8F-BDE7-9CA7A1C6151D}" type="datetimeFigureOut">
               <a:rPr lang="en-US" smtClean="0"/>
-              <a:t>6/2/2016</a:t>
+              <a:t>6/5/2016</a:t>
             </a:fld>
             <a:endParaRPr lang="en-US"/>
           </a:p>
@@ -11832,7 +11791,7 @@
           <a:p>
             <a:fld id="{7FF28D8F-E26C-4A8F-BDE7-9CA7A1C6151D}" type="datetimeFigureOut">
               <a:rPr lang="en-US" smtClean="0"/>
-              <a:t>6/2/2016</a:t>
+              <a:t>6/5/2016</a:t>
             </a:fld>
             <a:endParaRPr lang="en-US"/>
           </a:p>
@@ -12002,7 +11961,7 @@
           <a:p>
             <a:fld id="{7FF28D8F-E26C-4A8F-BDE7-9CA7A1C6151D}" type="datetimeFigureOut">
               <a:rPr lang="en-US" smtClean="0"/>
-              <a:t>6/2/2016</a:t>
+              <a:t>6/5/2016</a:t>
             </a:fld>
             <a:endParaRPr lang="en-US"/>
           </a:p>
@@ -12248,7 +12207,7 @@
           <a:p>
             <a:fld id="{7FF28D8F-E26C-4A8F-BDE7-9CA7A1C6151D}" type="datetimeFigureOut">
               <a:rPr lang="en-US" smtClean="0"/>
-              <a:t>6/2/2016</a:t>
+              <a:t>6/5/2016</a:t>
             </a:fld>
             <a:endParaRPr lang="en-US"/>
           </a:p>
@@ -12480,7 +12439,7 @@
           <a:p>
             <a:fld id="{7FF28D8F-E26C-4A8F-BDE7-9CA7A1C6151D}" type="datetimeFigureOut">
               <a:rPr lang="en-US" smtClean="0"/>
-              <a:t>6/2/2016</a:t>
+              <a:t>6/5/2016</a:t>
             </a:fld>
             <a:endParaRPr lang="en-US"/>
           </a:p>
@@ -12847,7 +12806,7 @@
           <a:p>
             <a:fld id="{7FF28D8F-E26C-4A8F-BDE7-9CA7A1C6151D}" type="datetimeFigureOut">
               <a:rPr lang="en-US" smtClean="0"/>
-              <a:t>6/2/2016</a:t>
+              <a:t>6/5/2016</a:t>
             </a:fld>
             <a:endParaRPr lang="en-US"/>
           </a:p>
@@ -12965,7 +12924,7 @@
           <a:p>
             <a:fld id="{7FF28D8F-E26C-4A8F-BDE7-9CA7A1C6151D}" type="datetimeFigureOut">
               <a:rPr lang="en-US" smtClean="0"/>
-              <a:t>6/2/2016</a:t>
+              <a:t>6/5/2016</a:t>
             </a:fld>
             <a:endParaRPr lang="en-US"/>
           </a:p>
@@ -13060,7 +13019,7 @@
           <a:p>
             <a:fld id="{7FF28D8F-E26C-4A8F-BDE7-9CA7A1C6151D}" type="datetimeFigureOut">
               <a:rPr lang="en-US" smtClean="0"/>
-              <a:t>6/2/2016</a:t>
+              <a:t>6/5/2016</a:t>
             </a:fld>
             <a:endParaRPr lang="en-US"/>
           </a:p>
@@ -13337,7 +13296,7 @@
           <a:p>
             <a:fld id="{7FF28D8F-E26C-4A8F-BDE7-9CA7A1C6151D}" type="datetimeFigureOut">
               <a:rPr lang="en-US" smtClean="0"/>
-              <a:t>6/2/2016</a:t>
+              <a:t>6/5/2016</a:t>
             </a:fld>
             <a:endParaRPr lang="en-US"/>
           </a:p>
@@ -13590,7 +13549,7 @@
           <a:p>
             <a:fld id="{7FF28D8F-E26C-4A8F-BDE7-9CA7A1C6151D}" type="datetimeFigureOut">
               <a:rPr lang="en-US" smtClean="0"/>
-              <a:t>6/2/2016</a:t>
+              <a:t>6/5/2016</a:t>
             </a:fld>
             <a:endParaRPr lang="en-US"/>
           </a:p>
@@ -13803,7 +13762,7 @@
           <a:p>
             <a:fld id="{7FF28D8F-E26C-4A8F-BDE7-9CA7A1C6151D}" type="datetimeFigureOut">
               <a:rPr lang="en-US" smtClean="0"/>
-              <a:t>6/2/2016</a:t>
+              <a:t>6/5/2016</a:t>
             </a:fld>
             <a:endParaRPr lang="en-US"/>
           </a:p>
@@ -29326,6 +29285,231 @@
           </a:prstGeom>
         </p:spPr>
       </p:pic>
+      <p:grpSp>
+        <p:nvGrpSpPr>
+          <p:cNvPr id="18" name="Group 17"/>
+          <p:cNvGrpSpPr/>
+          <p:nvPr/>
+        </p:nvGrpSpPr>
+        <p:grpSpPr>
+          <a:xfrm>
+            <a:off x="7767199" y="1952763"/>
+            <a:ext cx="503214" cy="246221"/>
+            <a:chOff x="10633172" y="3787139"/>
+            <a:chExt cx="503214" cy="246221"/>
+          </a:xfrm>
+        </p:grpSpPr>
+        <p:pic>
+          <p:nvPicPr>
+            <p:cNvPr id="19" name="Picture 18"/>
+            <p:cNvPicPr>
+              <a:picLocks noChangeAspect="1"/>
+            </p:cNvPicPr>
+            <p:nvPr/>
+          </p:nvPicPr>
+          <p:blipFill>
+            <a:blip r:embed="rId8">
+              <a:extLst>
+                <a:ext uri="{28A0092B-C50C-407E-A947-70E740481C1C}">
+                  <a14:useLocalDpi xmlns:a14="http://schemas.microsoft.com/office/drawing/2010/main" val="0"/>
+                </a:ext>
+              </a:extLst>
+            </a:blip>
+            <a:stretch>
+              <a:fillRect/>
+            </a:stretch>
+          </p:blipFill>
+          <p:spPr>
+            <a:xfrm>
+              <a:off x="10923291" y="3789576"/>
+              <a:ext cx="213095" cy="213095"/>
+            </a:xfrm>
+            <a:prstGeom prst="rect">
+              <a:avLst/>
+            </a:prstGeom>
+          </p:spPr>
+        </p:pic>
+        <p:sp>
+          <p:nvSpPr>
+            <p:cNvPr id="20" name="TextBox 19"/>
+            <p:cNvSpPr txBox="1"/>
+            <p:nvPr/>
+          </p:nvSpPr>
+          <p:spPr>
+            <a:xfrm>
+              <a:off x="10633172" y="3787139"/>
+              <a:ext cx="457200" cy="246221"/>
+            </a:xfrm>
+            <a:prstGeom prst="rect">
+              <a:avLst/>
+            </a:prstGeom>
+            <a:noFill/>
+          </p:spPr>
+          <p:txBody>
+            <a:bodyPr wrap="square" rtlCol="0">
+              <a:spAutoFit/>
+            </a:bodyPr>
+            <a:lstStyle/>
+            <a:p>
+              <a:r>
+                <a:rPr lang="en-US" sz="1000" b="1" dirty="0" smtClean="0"/>
+                <a:t>15</a:t>
+              </a:r>
+              <a:endParaRPr lang="en-US" sz="1000" b="1" dirty="0"/>
+            </a:p>
+          </p:txBody>
+        </p:sp>
+      </p:grpSp>
+      <p:grpSp>
+        <p:nvGrpSpPr>
+          <p:cNvPr id="21" name="Group 20"/>
+          <p:cNvGrpSpPr/>
+          <p:nvPr/>
+        </p:nvGrpSpPr>
+        <p:grpSpPr>
+          <a:xfrm>
+            <a:off x="7767199" y="2193333"/>
+            <a:ext cx="503214" cy="256588"/>
+            <a:chOff x="10633172" y="4027709"/>
+            <a:chExt cx="503214" cy="256588"/>
+          </a:xfrm>
+        </p:grpSpPr>
+        <p:pic>
+          <p:nvPicPr>
+            <p:cNvPr id="22" name="Picture 21"/>
+            <p:cNvPicPr>
+              <a:picLocks noChangeAspect="1"/>
+            </p:cNvPicPr>
+            <p:nvPr/>
+          </p:nvPicPr>
+          <p:blipFill>
+            <a:blip r:embed="rId8">
+              <a:extLst>
+                <a:ext uri="{28A0092B-C50C-407E-A947-70E740481C1C}">
+                  <a14:useLocalDpi xmlns:a14="http://schemas.microsoft.com/office/drawing/2010/main" val="0"/>
+                </a:ext>
+              </a:extLst>
+            </a:blip>
+            <a:stretch>
+              <a:fillRect/>
+            </a:stretch>
+          </p:blipFill>
+          <p:spPr>
+            <a:xfrm>
+              <a:off x="10923291" y="4027709"/>
+              <a:ext cx="213095" cy="213095"/>
+            </a:xfrm>
+            <a:prstGeom prst="rect">
+              <a:avLst/>
+            </a:prstGeom>
+          </p:spPr>
+        </p:pic>
+        <p:sp>
+          <p:nvSpPr>
+            <p:cNvPr id="23" name="TextBox 22"/>
+            <p:cNvSpPr txBox="1"/>
+            <p:nvPr/>
+          </p:nvSpPr>
+          <p:spPr>
+            <a:xfrm>
+              <a:off x="10633172" y="4038076"/>
+              <a:ext cx="457200" cy="246221"/>
+            </a:xfrm>
+            <a:prstGeom prst="rect">
+              <a:avLst/>
+            </a:prstGeom>
+            <a:noFill/>
+          </p:spPr>
+          <p:txBody>
+            <a:bodyPr wrap="square" rtlCol="0">
+              <a:spAutoFit/>
+            </a:bodyPr>
+            <a:lstStyle/>
+            <a:p>
+              <a:r>
+                <a:rPr lang="en-US" sz="1000" b="1" dirty="0" smtClean="0"/>
+                <a:t>5</a:t>
+              </a:r>
+              <a:endParaRPr lang="en-US" sz="1000" b="1" dirty="0"/>
+            </a:p>
+          </p:txBody>
+        </p:sp>
+      </p:grpSp>
+      <p:grpSp>
+        <p:nvGrpSpPr>
+          <p:cNvPr id="24" name="Group 23"/>
+          <p:cNvGrpSpPr/>
+          <p:nvPr/>
+        </p:nvGrpSpPr>
+        <p:grpSpPr>
+          <a:xfrm>
+            <a:off x="7767199" y="2406428"/>
+            <a:ext cx="503214" cy="259449"/>
+            <a:chOff x="10633172" y="4240804"/>
+            <a:chExt cx="503214" cy="259449"/>
+          </a:xfrm>
+        </p:grpSpPr>
+        <p:pic>
+          <p:nvPicPr>
+            <p:cNvPr id="25" name="Picture 24"/>
+            <p:cNvPicPr>
+              <a:picLocks noChangeAspect="1"/>
+            </p:cNvPicPr>
+            <p:nvPr/>
+          </p:nvPicPr>
+          <p:blipFill>
+            <a:blip r:embed="rId9">
+              <a:extLst>
+                <a:ext uri="{28A0092B-C50C-407E-A947-70E740481C1C}">
+                  <a14:useLocalDpi xmlns:a14="http://schemas.microsoft.com/office/drawing/2010/main" val="0"/>
+                </a:ext>
+              </a:extLst>
+            </a:blip>
+            <a:stretch>
+              <a:fillRect/>
+            </a:stretch>
+          </p:blipFill>
+          <p:spPr>
+            <a:xfrm>
+              <a:off x="10923291" y="4240804"/>
+              <a:ext cx="213095" cy="213095"/>
+            </a:xfrm>
+            <a:prstGeom prst="rect">
+              <a:avLst/>
+            </a:prstGeom>
+          </p:spPr>
+        </p:pic>
+        <p:sp>
+          <p:nvSpPr>
+            <p:cNvPr id="26" name="TextBox 25"/>
+            <p:cNvSpPr txBox="1"/>
+            <p:nvPr/>
+          </p:nvSpPr>
+          <p:spPr>
+            <a:xfrm>
+              <a:off x="10633172" y="4254032"/>
+              <a:ext cx="457200" cy="246221"/>
+            </a:xfrm>
+            <a:prstGeom prst="rect">
+              <a:avLst/>
+            </a:prstGeom>
+            <a:noFill/>
+          </p:spPr>
+          <p:txBody>
+            <a:bodyPr wrap="square" rtlCol="0">
+              <a:spAutoFit/>
+            </a:bodyPr>
+            <a:lstStyle/>
+            <a:p>
+              <a:r>
+                <a:rPr lang="en-US" sz="1000" b="1" dirty="0" smtClean="0"/>
+                <a:t>2</a:t>
+              </a:r>
+              <a:endParaRPr lang="en-US" sz="1000" b="1" dirty="0"/>
+            </a:p>
+          </p:txBody>
+        </p:sp>
+      </p:grpSp>
     </p:spTree>
     <p:extLst>
       <p:ext uri="{BB962C8B-B14F-4D97-AF65-F5344CB8AC3E}">

</xml_diff>